<commit_message>
Working on co-author suggestions
</commit_message>
<xml_diff>
--- a/doc/figures/mf6definition.pptx
+++ b/doc/figures/mf6definition.pptx
@@ -254,7 +254,7 @@
           <a:p>
             <a:fld id="{DCE0A673-C478-6D4D-A4B7-394B079139A0}" type="datetimeFigureOut">
               <a:rPr lang="en-US" smtClean="0"/>
-              <a:t>7/29/22</a:t>
+              <a:t>11/16/22</a:t>
             </a:fld>
             <a:endParaRPr lang="en-US"/>
           </a:p>
@@ -424,7 +424,7 @@
           <a:p>
             <a:fld id="{DCE0A673-C478-6D4D-A4B7-394B079139A0}" type="datetimeFigureOut">
               <a:rPr lang="en-US" smtClean="0"/>
-              <a:t>7/29/22</a:t>
+              <a:t>11/16/22</a:t>
             </a:fld>
             <a:endParaRPr lang="en-US"/>
           </a:p>
@@ -604,7 +604,7 @@
           <a:p>
             <a:fld id="{DCE0A673-C478-6D4D-A4B7-394B079139A0}" type="datetimeFigureOut">
               <a:rPr lang="en-US" smtClean="0"/>
-              <a:t>7/29/22</a:t>
+              <a:t>11/16/22</a:t>
             </a:fld>
             <a:endParaRPr lang="en-US"/>
           </a:p>
@@ -774,7 +774,7 @@
           <a:p>
             <a:fld id="{DCE0A673-C478-6D4D-A4B7-394B079139A0}" type="datetimeFigureOut">
               <a:rPr lang="en-US" smtClean="0"/>
-              <a:t>7/29/22</a:t>
+              <a:t>11/16/22</a:t>
             </a:fld>
             <a:endParaRPr lang="en-US"/>
           </a:p>
@@ -1018,7 +1018,7 @@
           <a:p>
             <a:fld id="{DCE0A673-C478-6D4D-A4B7-394B079139A0}" type="datetimeFigureOut">
               <a:rPr lang="en-US" smtClean="0"/>
-              <a:t>7/29/22</a:t>
+              <a:t>11/16/22</a:t>
             </a:fld>
             <a:endParaRPr lang="en-US"/>
           </a:p>
@@ -1250,7 +1250,7 @@
           <a:p>
             <a:fld id="{DCE0A673-C478-6D4D-A4B7-394B079139A0}" type="datetimeFigureOut">
               <a:rPr lang="en-US" smtClean="0"/>
-              <a:t>7/29/22</a:t>
+              <a:t>11/16/22</a:t>
             </a:fld>
             <a:endParaRPr lang="en-US"/>
           </a:p>
@@ -1617,7 +1617,7 @@
           <a:p>
             <a:fld id="{DCE0A673-C478-6D4D-A4B7-394B079139A0}" type="datetimeFigureOut">
               <a:rPr lang="en-US" smtClean="0"/>
-              <a:t>7/29/22</a:t>
+              <a:t>11/16/22</a:t>
             </a:fld>
             <a:endParaRPr lang="en-US"/>
           </a:p>
@@ -1735,7 +1735,7 @@
           <a:p>
             <a:fld id="{DCE0A673-C478-6D4D-A4B7-394B079139A0}" type="datetimeFigureOut">
               <a:rPr lang="en-US" smtClean="0"/>
-              <a:t>7/29/22</a:t>
+              <a:t>11/16/22</a:t>
             </a:fld>
             <a:endParaRPr lang="en-US"/>
           </a:p>
@@ -1830,7 +1830,7 @@
           <a:p>
             <a:fld id="{DCE0A673-C478-6D4D-A4B7-394B079139A0}" type="datetimeFigureOut">
               <a:rPr lang="en-US" smtClean="0"/>
-              <a:t>7/29/22</a:t>
+              <a:t>11/16/22</a:t>
             </a:fld>
             <a:endParaRPr lang="en-US"/>
           </a:p>
@@ -2107,7 +2107,7 @@
           <a:p>
             <a:fld id="{DCE0A673-C478-6D4D-A4B7-394B079139A0}" type="datetimeFigureOut">
               <a:rPr lang="en-US" smtClean="0"/>
-              <a:t>7/29/22</a:t>
+              <a:t>11/16/22</a:t>
             </a:fld>
             <a:endParaRPr lang="en-US"/>
           </a:p>
@@ -2364,7 +2364,7 @@
           <a:p>
             <a:fld id="{DCE0A673-C478-6D4D-A4B7-394B079139A0}" type="datetimeFigureOut">
               <a:rPr lang="en-US" smtClean="0"/>
-              <a:t>7/29/22</a:t>
+              <a:t>11/16/22</a:t>
             </a:fld>
             <a:endParaRPr lang="en-US"/>
           </a:p>
@@ -2577,7 +2577,7 @@
           <a:p>
             <a:fld id="{DCE0A673-C478-6D4D-A4B7-394B079139A0}" type="datetimeFigureOut">
               <a:rPr lang="en-US" smtClean="0"/>
-              <a:t>7/29/22</a:t>
+              <a:t>11/16/22</a:t>
             </a:fld>
             <a:endParaRPr lang="en-US"/>
           </a:p>
@@ -2968,6 +2968,16 @@
 <file path=ppt/slides/slide1.xml><?xml version="1.0" encoding="utf-8"?>
 <p:sld xmlns:a="http://schemas.openxmlformats.org/drawingml/2006/main" xmlns:r="http://schemas.openxmlformats.org/officeDocument/2006/relationships" xmlns:p="http://schemas.openxmlformats.org/presentationml/2006/main">
   <p:cSld>
+    <p:bg>
+      <p:bgPr>
+        <a:solidFill>
+          <a:schemeClr val="bg1">
+            <a:alpha val="0"/>
+          </a:schemeClr>
+        </a:solidFill>
+        <a:effectLst/>
+      </p:bgPr>
+    </p:bg>
     <p:spTree>
       <p:nvGrpSpPr>
         <p:cNvPr id="1" name=""/>

</xml_diff>